<commit_message>
add presentation for the master seminar
</commit_message>
<xml_diff>
--- a/presentation/20170106-master-seminar.pptx
+++ b/presentation/20170106-master-seminar.pptx
@@ -223,7 +223,7 @@
           <a:p>
             <a:fld id="{91A79A0D-7D40-48AF-9AC8-3B71E119E35B}" type="datetimeFigureOut">
               <a:rPr lang="de-DE" smtClean="0"/>
-              <a:t>30.05.2017</a:t>
+              <a:t>01.06.2017</a:t>
             </a:fld>
             <a:endParaRPr lang="de-DE"/>
           </a:p>
@@ -388,7 +388,7 @@
           <a:p>
             <a:fld id="{50B8443B-8591-4186-BA0E-583841011C27}" type="datetimeFigureOut">
               <a:rPr lang="de-DE" smtClean="0"/>
-              <a:t>30.05.2017</a:t>
+              <a:t>01.06.2017</a:t>
             </a:fld>
             <a:endParaRPr lang="de-DE"/>
           </a:p>
@@ -1123,7 +1123,7 @@
           <a:p>
             <a:fld id="{A5974D0C-3C07-4C76-9806-51838E346B84}" type="datetime1">
               <a:rPr lang="de-DE" smtClean="0"/>
-              <a:t>30.05.2017</a:t>
+              <a:t>01.06.2017</a:t>
             </a:fld>
             <a:endParaRPr lang="de-DE"/>
           </a:p>
@@ -1330,7 +1330,7 @@
           <a:p>
             <a:fld id="{548C4524-1C23-4F93-8032-046ADF7D363A}" type="datetime1">
               <a:rPr lang="de-DE" smtClean="0"/>
-              <a:t>30.05.2017</a:t>
+              <a:t>01.06.2017</a:t>
             </a:fld>
             <a:endParaRPr lang="de-DE"/>
           </a:p>
@@ -1558,7 +1558,7 @@
             <a:fld id="{FCD7E7C2-4B8F-4989-ACDA-BBBEECDFB473}" type="datetime1">
               <a:rPr lang="de-DE" smtClean="0"/>
               <a:pPr/>
-              <a:t>30.05.2017</a:t>
+              <a:t>01.06.2017</a:t>
             </a:fld>
             <a:endParaRPr lang="de-DE" dirty="0"/>
           </a:p>
@@ -2122,7 +2122,7 @@
           <a:p>
             <a:fld id="{B3521F2F-19F7-4745-A7E5-D6FC4A395C8D}" type="datetime1">
               <a:rPr lang="de-DE" smtClean="0"/>
-              <a:t>30.05.2017</a:t>
+              <a:t>01.06.2017</a:t>
             </a:fld>
             <a:endParaRPr lang="de-DE"/>
           </a:p>
@@ -2516,7 +2516,7 @@
           <a:p>
             <a:fld id="{5B03B32A-C2D8-44A4-B6F4-358B815D4703}" type="datetime1">
               <a:rPr lang="de-DE" smtClean="0"/>
-              <a:t>30.05.2017</a:t>
+              <a:t>01.06.2017</a:t>
             </a:fld>
             <a:endParaRPr lang="de-DE"/>
           </a:p>
@@ -2661,7 +2661,7 @@
           <a:p>
             <a:fld id="{6DC45F1C-52C5-4399-9FBB-A699DC92C7AE}" type="datetime1">
               <a:rPr lang="de-DE" smtClean="0"/>
-              <a:t>30.05.2017</a:t>
+              <a:t>01.06.2017</a:t>
             </a:fld>
             <a:endParaRPr lang="de-DE"/>
           </a:p>
@@ -2783,7 +2783,7 @@
           <a:p>
             <a:fld id="{5D7C8DF1-CB90-4C66-91F8-DAAE9ADE1353}" type="datetime1">
               <a:rPr lang="de-DE" smtClean="0"/>
-              <a:t>30.05.2017</a:t>
+              <a:t>01.06.2017</a:t>
             </a:fld>
             <a:endParaRPr lang="de-DE"/>
           </a:p>
@@ -3087,7 +3087,7 @@
           <a:p>
             <a:fld id="{6966B97A-897C-4531-94E8-5C4EA180FDBB}" type="datetime1">
               <a:rPr lang="de-DE" smtClean="0"/>
-              <a:t>30.05.2017</a:t>
+              <a:t>01.06.2017</a:t>
             </a:fld>
             <a:endParaRPr lang="de-DE"/>
           </a:p>
@@ -3367,7 +3367,7 @@
           <a:p>
             <a:fld id="{CCE2A79C-697E-42A0-AA75-FCDA7BBCDF59}" type="datetime1">
               <a:rPr lang="de-DE" smtClean="0"/>
-              <a:t>30.05.2017</a:t>
+              <a:t>01.06.2017</a:t>
             </a:fld>
             <a:endParaRPr lang="de-DE"/>
           </a:p>
@@ -4133,7 +4133,7 @@
           <a:p>
             <a:fld id="{21944E0F-9EDA-4706-90E4-491605A404BD}" type="datetime1">
               <a:rPr lang="de-DE" smtClean="0"/>
-              <a:t>30.05.2017</a:t>
+              <a:t>01.06.2017</a:t>
             </a:fld>
             <a:endParaRPr lang="de-DE" dirty="0"/>
           </a:p>
@@ -4454,7 +4454,7 @@
             <a:fld id="{FCD7E7C2-4B8F-4989-ACDA-BBBEECDFB473}" type="datetime1">
               <a:rPr lang="de-DE" smtClean="0"/>
               <a:pPr/>
-              <a:t>30.05.2017</a:t>
+              <a:t>01.06.2017</a:t>
             </a:fld>
             <a:endParaRPr lang="de-DE" dirty="0"/>
           </a:p>
@@ -4658,7 +4658,7 @@
             <a:fld id="{FCD7E7C2-4B8F-4989-ACDA-BBBEECDFB473}" type="datetime1">
               <a:rPr lang="de-DE" smtClean="0"/>
               <a:pPr/>
-              <a:t>30.05.2017</a:t>
+              <a:t>01.06.2017</a:t>
             </a:fld>
             <a:endParaRPr lang="de-DE" dirty="0"/>
           </a:p>
@@ -5169,7 +5169,7 @@
             <a:fld id="{FCD7E7C2-4B8F-4989-ACDA-BBBEECDFB473}" type="datetime1">
               <a:rPr lang="de-DE" smtClean="0"/>
               <a:pPr/>
-              <a:t>30.05.2017</a:t>
+              <a:t>01.06.2017</a:t>
             </a:fld>
             <a:endParaRPr lang="de-DE" dirty="0"/>
           </a:p>
@@ -6626,7 +6626,7 @@
             <a:fld id="{FCD7E7C2-4B8F-4989-ACDA-BBBEECDFB473}" type="datetime1">
               <a:rPr lang="de-DE" smtClean="0"/>
               <a:pPr/>
-              <a:t>30.05.2017</a:t>
+              <a:t>01.06.2017</a:t>
             </a:fld>
             <a:endParaRPr lang="de-DE" dirty="0"/>
           </a:p>
@@ -7404,7 +7404,7 @@
             <a:fld id="{FCD7E7C2-4B8F-4989-ACDA-BBBEECDFB473}" type="datetime1">
               <a:rPr lang="de-DE" smtClean="0"/>
               <a:pPr/>
-              <a:t>30.05.2017</a:t>
+              <a:t>01.06.2017</a:t>
             </a:fld>
             <a:endParaRPr lang="de-DE" dirty="0"/>
           </a:p>
@@ -7902,7 +7902,7 @@
           <a:p>
             <a:fld id="{0DCD4440-A392-468D-9172-BE099E311DC2}" type="datetime1">
               <a:rPr lang="de-DE" smtClean="0"/>
-              <a:t>30.05.2017</a:t>
+              <a:t>01.06.2017</a:t>
             </a:fld>
             <a:endParaRPr lang="de-DE" dirty="0"/>
           </a:p>
@@ -8083,7 +8083,7 @@
             <a:fld id="{FCD7E7C2-4B8F-4989-ACDA-BBBEECDFB473}" type="datetime1">
               <a:rPr lang="de-DE" smtClean="0"/>
               <a:pPr/>
-              <a:t>30.05.2017</a:t>
+              <a:t>01.06.2017</a:t>
             </a:fld>
             <a:endParaRPr lang="de-DE" dirty="0"/>
           </a:p>
@@ -8374,7 +8374,7 @@
           <a:p>
             <a:fld id="{FCD7E7C2-4B8F-4989-ACDA-BBBEECDFB473}" type="datetime1">
               <a:rPr lang="de-DE" smtClean="0"/>
-              <a:t>30.05.2017</a:t>
+              <a:t>01.06.2017</a:t>
             </a:fld>
             <a:endParaRPr lang="de-DE" dirty="0"/>
           </a:p>
@@ -10373,7 +10373,7 @@
           <a:p>
             <a:fld id="{FCD7E7C2-4B8F-4989-ACDA-BBBEECDFB473}" type="datetime1">
               <a:rPr lang="de-DE" smtClean="0"/>
-              <a:t>30.05.2017</a:t>
+              <a:t>01.06.2017</a:t>
             </a:fld>
             <a:endParaRPr lang="de-DE" dirty="0"/>
           </a:p>
@@ -11791,7 +11791,7 @@
           <a:p>
             <a:fld id="{FCD7E7C2-4B8F-4989-ACDA-BBBEECDFB473}" type="datetime1">
               <a:rPr lang="de-DE" smtClean="0"/>
-              <a:t>30.05.2017</a:t>
+              <a:t>01.06.2017</a:t>
             </a:fld>
             <a:endParaRPr lang="de-DE" dirty="0"/>
           </a:p>
@@ -12573,7 +12573,7 @@
           <a:p>
             <a:fld id="{FCD7E7C2-4B8F-4989-ACDA-BBBEECDFB473}" type="datetime1">
               <a:rPr lang="de-DE" smtClean="0"/>
-              <a:t>30.05.2017</a:t>
+              <a:t>01.06.2017</a:t>
             </a:fld>
             <a:endParaRPr lang="de-DE" dirty="0"/>
           </a:p>

</xml_diff>